<commit_message>
Reflection presentation and workshop
</commit_message>
<xml_diff>
--- a/Reflection/Reflection.pptx
+++ b/Reflection/Reflection.pptx
@@ -232,7 +232,7 @@
             <a:fld id="{4F94E7C4-328C-457B-8CA2-EE381C323794}" type="datetimeFigureOut">
               <a:rPr lang="en-US" smtClean="0"/>
               <a:pPr/>
-              <a:t>6/28/2016</a:t>
+              <a:t>7/6/2016</a:t>
             </a:fld>
             <a:endParaRPr lang="en-US"/>
           </a:p>
@@ -545,14 +545,6 @@
           <a:bodyPr/>
           <a:lstStyle/>
           <a:p>
-            <a:r>
-              <a:rPr lang="ro-RO" dirty="0" smtClean="0"/>
-              <a:t>JVM – este o masina</a:t>
-            </a:r>
-            <a:r>
-              <a:rPr lang="ro-RO" baseline="0" dirty="0" smtClean="0"/>
-              <a:t> virtuala pe care poti rula cod java;</a:t>
-            </a:r>
             <a:endParaRPr lang="en-US" dirty="0"/>
           </a:p>
         </p:txBody>
@@ -575,7 +567,7 @@
             <a:fld id="{84377D70-F193-4353-836F-31B604DF4B77}" type="slidenum">
               <a:rPr lang="en-US" smtClean="0"/>
               <a:pPr/>
-              <a:t>4</a:t>
+              <a:t>2</a:t>
             </a:fld>
             <a:endParaRPr lang="en-US"/>
           </a:p>
@@ -584,7 +576,7 @@
     </p:spTree>
     <p:extLst>
       <p:ext uri="{BB962C8B-B14F-4D97-AF65-F5344CB8AC3E}">
-        <p14:creationId xmlns:p14="http://schemas.microsoft.com/office/powerpoint/2010/main" val="3951170673"/>
+        <p14:creationId xmlns:p14="http://schemas.microsoft.com/office/powerpoint/2010/main" val="2860537335"/>
       </p:ext>
     </p:extLst>
   </p:cSld>
@@ -640,11 +632,11 @@
           <a:p>
             <a:r>
               <a:rPr lang="ro-RO" dirty="0" smtClean="0"/>
-              <a:t>Framework-uri</a:t>
+              <a:t>JVM – este o masina</a:t>
             </a:r>
             <a:r>
               <a:rPr lang="ro-RO" baseline="0" dirty="0" smtClean="0"/>
-              <a:t> care folosesc reflection: Junit;</a:t>
+              <a:t> virtuala pe care poti rula cod java;</a:t>
             </a:r>
             <a:endParaRPr lang="en-US" dirty="0"/>
           </a:p>
@@ -668,7 +660,7 @@
             <a:fld id="{84377D70-F193-4353-836F-31B604DF4B77}" type="slidenum">
               <a:rPr lang="en-US" smtClean="0"/>
               <a:pPr/>
-              <a:t>5</a:t>
+              <a:t>4</a:t>
             </a:fld>
             <a:endParaRPr lang="en-US"/>
           </a:p>
@@ -677,7 +669,7 @@
     </p:spTree>
     <p:extLst>
       <p:ext uri="{BB962C8B-B14F-4D97-AF65-F5344CB8AC3E}">
-        <p14:creationId xmlns:p14="http://schemas.microsoft.com/office/powerpoint/2010/main" val="1859322926"/>
+        <p14:creationId xmlns:p14="http://schemas.microsoft.com/office/powerpoint/2010/main" val="3951170673"/>
       </p:ext>
     </p:extLst>
   </p:cSld>
@@ -733,6 +725,99 @@
           <a:p>
             <a:r>
               <a:rPr lang="ro-RO" dirty="0" smtClean="0"/>
+              <a:t>Framework-uri</a:t>
+            </a:r>
+            <a:r>
+              <a:rPr lang="ro-RO" baseline="0" dirty="0" smtClean="0"/>
+              <a:t> care folosesc reflection: Junit;</a:t>
+            </a:r>
+            <a:endParaRPr lang="en-US" dirty="0"/>
+          </a:p>
+        </p:txBody>
+      </p:sp>
+      <p:sp>
+        <p:nvSpPr>
+          <p:cNvPr id="4" name="Slide Number Placeholder 3"/>
+          <p:cNvSpPr>
+            <a:spLocks noGrp="1"/>
+          </p:cNvSpPr>
+          <p:nvPr>
+            <p:ph type="sldNum" sz="quarter" idx="10"/>
+          </p:nvPr>
+        </p:nvSpPr>
+        <p:spPr/>
+        <p:txBody>
+          <a:bodyPr/>
+          <a:lstStyle/>
+          <a:p>
+            <a:fld id="{84377D70-F193-4353-836F-31B604DF4B77}" type="slidenum">
+              <a:rPr lang="en-US" smtClean="0"/>
+              <a:pPr/>
+              <a:t>5</a:t>
+            </a:fld>
+            <a:endParaRPr lang="en-US"/>
+          </a:p>
+        </p:txBody>
+      </p:sp>
+    </p:spTree>
+    <p:extLst>
+      <p:ext uri="{BB962C8B-B14F-4D97-AF65-F5344CB8AC3E}">
+        <p14:creationId xmlns:p14="http://schemas.microsoft.com/office/powerpoint/2010/main" val="1859322926"/>
+      </p:ext>
+    </p:extLst>
+  </p:cSld>
+  <p:clrMapOvr>
+    <a:masterClrMapping/>
+  </p:clrMapOvr>
+</p:notes>
+</file>
+
+<file path=ppt/notesSlides/notesSlide4.xml><?xml version="1.0" encoding="utf-8"?>
+<p:notes xmlns:a="http://schemas.openxmlformats.org/drawingml/2006/main" xmlns:r="http://schemas.openxmlformats.org/officeDocument/2006/relationships" xmlns:p="http://schemas.openxmlformats.org/presentationml/2006/main">
+  <p:cSld>
+    <p:spTree>
+      <p:nvGrpSpPr>
+        <p:cNvPr id="1" name=""/>
+        <p:cNvGrpSpPr/>
+        <p:nvPr/>
+      </p:nvGrpSpPr>
+      <p:grpSpPr>
+        <a:xfrm>
+          <a:off x="0" y="0"/>
+          <a:ext cx="0" cy="0"/>
+          <a:chOff x="0" y="0"/>
+          <a:chExt cx="0" cy="0"/>
+        </a:xfrm>
+      </p:grpSpPr>
+      <p:sp>
+        <p:nvSpPr>
+          <p:cNvPr id="2" name="Slide Image Placeholder 1"/>
+          <p:cNvSpPr>
+            <a:spLocks noGrp="1" noRot="1" noChangeAspect="1"/>
+          </p:cNvSpPr>
+          <p:nvPr>
+            <p:ph type="sldImg"/>
+          </p:nvPr>
+        </p:nvSpPr>
+        <p:spPr/>
+      </p:sp>
+      <p:sp>
+        <p:nvSpPr>
+          <p:cNvPr id="3" name="Notes Placeholder 2"/>
+          <p:cNvSpPr>
+            <a:spLocks noGrp="1"/>
+          </p:cNvSpPr>
+          <p:nvPr>
+            <p:ph type="body" idx="1"/>
+          </p:nvPr>
+        </p:nvSpPr>
+        <p:spPr/>
+        <p:txBody>
+          <a:bodyPr/>
+          <a:lstStyle/>
+          <a:p>
+            <a:r>
+              <a:rPr lang="ro-RO" dirty="0" smtClean="0"/>
               <a:t>Security restriction:</a:t>
             </a:r>
             <a:r>
@@ -771,6 +856,556 @@
     <p:extLst>
       <p:ext uri="{BB962C8B-B14F-4D97-AF65-F5344CB8AC3E}">
         <p14:creationId xmlns:p14="http://schemas.microsoft.com/office/powerpoint/2010/main" val="52043774"/>
+      </p:ext>
+    </p:extLst>
+  </p:cSld>
+  <p:clrMapOvr>
+    <a:masterClrMapping/>
+  </p:clrMapOvr>
+</p:notes>
+</file>
+
+<file path=ppt/notesSlides/notesSlide5.xml><?xml version="1.0" encoding="utf-8"?>
+<p:notes xmlns:a="http://schemas.openxmlformats.org/drawingml/2006/main" xmlns:r="http://schemas.openxmlformats.org/officeDocument/2006/relationships" xmlns:p="http://schemas.openxmlformats.org/presentationml/2006/main">
+  <p:cSld>
+    <p:spTree>
+      <p:nvGrpSpPr>
+        <p:cNvPr id="1" name=""/>
+        <p:cNvGrpSpPr/>
+        <p:nvPr/>
+      </p:nvGrpSpPr>
+      <p:grpSpPr>
+        <a:xfrm>
+          <a:off x="0" y="0"/>
+          <a:ext cx="0" cy="0"/>
+          <a:chOff x="0" y="0"/>
+          <a:chExt cx="0" cy="0"/>
+        </a:xfrm>
+      </p:grpSpPr>
+      <p:sp>
+        <p:nvSpPr>
+          <p:cNvPr id="2" name="Slide Image Placeholder 1"/>
+          <p:cNvSpPr>
+            <a:spLocks noGrp="1" noRot="1" noChangeAspect="1"/>
+          </p:cNvSpPr>
+          <p:nvPr>
+            <p:ph type="sldImg"/>
+          </p:nvPr>
+        </p:nvSpPr>
+        <p:spPr/>
+      </p:sp>
+      <p:sp>
+        <p:nvSpPr>
+          <p:cNvPr id="3" name="Notes Placeholder 2"/>
+          <p:cNvSpPr>
+            <a:spLocks noGrp="1"/>
+          </p:cNvSpPr>
+          <p:nvPr>
+            <p:ph type="body" idx="1"/>
+          </p:nvPr>
+        </p:nvSpPr>
+        <p:spPr/>
+        <p:txBody>
+          <a:bodyPr/>
+          <a:lstStyle/>
+          <a:p>
+            <a:r>
+              <a:rPr lang="ro-RO" dirty="0" smtClean="0"/>
+              <a:t>getDeclaredField</a:t>
+            </a:r>
+            <a:r>
+              <a:rPr lang="ro-RO" baseline="0" dirty="0" smtClean="0"/>
+              <a:t>() – returneaza campul din clasa curenta, fara sa tina cont de nivelul de accesibilitate</a:t>
+            </a:r>
+          </a:p>
+          <a:p>
+            <a:r>
+              <a:rPr lang="ro-RO" baseline="0" dirty="0" smtClean="0"/>
+              <a:t>getField() – retuneza campurile publice din clasele pe care le  mostenesc</a:t>
+            </a:r>
+            <a:endParaRPr lang="en-US" dirty="0"/>
+          </a:p>
+        </p:txBody>
+      </p:sp>
+      <p:sp>
+        <p:nvSpPr>
+          <p:cNvPr id="4" name="Slide Number Placeholder 3"/>
+          <p:cNvSpPr>
+            <a:spLocks noGrp="1"/>
+          </p:cNvSpPr>
+          <p:nvPr>
+            <p:ph type="sldNum" sz="quarter" idx="10"/>
+          </p:nvPr>
+        </p:nvSpPr>
+        <p:spPr/>
+        <p:txBody>
+          <a:bodyPr/>
+          <a:lstStyle/>
+          <a:p>
+            <a:fld id="{84377D70-F193-4353-836F-31B604DF4B77}" type="slidenum">
+              <a:rPr lang="en-US" smtClean="0"/>
+              <a:pPr/>
+              <a:t>10</a:t>
+            </a:fld>
+            <a:endParaRPr lang="en-US"/>
+          </a:p>
+        </p:txBody>
+      </p:sp>
+    </p:spTree>
+    <p:extLst>
+      <p:ext uri="{BB962C8B-B14F-4D97-AF65-F5344CB8AC3E}">
+        <p14:creationId xmlns:p14="http://schemas.microsoft.com/office/powerpoint/2010/main" val="1438325581"/>
+      </p:ext>
+    </p:extLst>
+  </p:cSld>
+  <p:clrMapOvr>
+    <a:masterClrMapping/>
+  </p:clrMapOvr>
+</p:notes>
+</file>
+
+<file path=ppt/notesSlides/notesSlide6.xml><?xml version="1.0" encoding="utf-8"?>
+<p:notes xmlns:a="http://schemas.openxmlformats.org/drawingml/2006/main" xmlns:r="http://schemas.openxmlformats.org/officeDocument/2006/relationships" xmlns:p="http://schemas.openxmlformats.org/presentationml/2006/main">
+  <p:cSld>
+    <p:spTree>
+      <p:nvGrpSpPr>
+        <p:cNvPr id="1" name=""/>
+        <p:cNvGrpSpPr/>
+        <p:nvPr/>
+      </p:nvGrpSpPr>
+      <p:grpSpPr>
+        <a:xfrm>
+          <a:off x="0" y="0"/>
+          <a:ext cx="0" cy="0"/>
+          <a:chOff x="0" y="0"/>
+          <a:chExt cx="0" cy="0"/>
+        </a:xfrm>
+      </p:grpSpPr>
+      <p:sp>
+        <p:nvSpPr>
+          <p:cNvPr id="2" name="Slide Image Placeholder 1"/>
+          <p:cNvSpPr>
+            <a:spLocks noGrp="1" noRot="1" noChangeAspect="1"/>
+          </p:cNvSpPr>
+          <p:nvPr>
+            <p:ph type="sldImg"/>
+          </p:nvPr>
+        </p:nvSpPr>
+        <p:spPr/>
+      </p:sp>
+      <p:sp>
+        <p:nvSpPr>
+          <p:cNvPr id="3" name="Notes Placeholder 2"/>
+          <p:cNvSpPr>
+            <a:spLocks noGrp="1"/>
+          </p:cNvSpPr>
+          <p:nvPr>
+            <p:ph type="body" idx="1"/>
+          </p:nvPr>
+        </p:nvSpPr>
+        <p:spPr/>
+        <p:txBody>
+          <a:bodyPr/>
+          <a:lstStyle/>
+          <a:p>
+            <a:r>
+              <a:rPr lang="ro-RO" dirty="0" smtClean="0"/>
+              <a:t>getDeclaredConstructor() – retuneaza toti constructorii, fara sa tina cont de modificatorul</a:t>
+            </a:r>
+            <a:r>
+              <a:rPr lang="ro-RO" baseline="0" dirty="0" smtClean="0"/>
+              <a:t> de acces</a:t>
+            </a:r>
+          </a:p>
+          <a:p>
+            <a:r>
+              <a:rPr lang="ro-RO" baseline="0" dirty="0" smtClean="0"/>
+              <a:t>getConstructor() – returneaza numai constructorul public</a:t>
+            </a:r>
+            <a:endParaRPr lang="en-US" dirty="0"/>
+          </a:p>
+        </p:txBody>
+      </p:sp>
+      <p:sp>
+        <p:nvSpPr>
+          <p:cNvPr id="4" name="Slide Number Placeholder 3"/>
+          <p:cNvSpPr>
+            <a:spLocks noGrp="1"/>
+          </p:cNvSpPr>
+          <p:nvPr>
+            <p:ph type="sldNum" sz="quarter" idx="10"/>
+          </p:nvPr>
+        </p:nvSpPr>
+        <p:spPr/>
+        <p:txBody>
+          <a:bodyPr/>
+          <a:lstStyle/>
+          <a:p>
+            <a:fld id="{84377D70-F193-4353-836F-31B604DF4B77}" type="slidenum">
+              <a:rPr lang="en-US" smtClean="0"/>
+              <a:pPr/>
+              <a:t>12</a:t>
+            </a:fld>
+            <a:endParaRPr lang="en-US"/>
+          </a:p>
+        </p:txBody>
+      </p:sp>
+    </p:spTree>
+    <p:extLst>
+      <p:ext uri="{BB962C8B-B14F-4D97-AF65-F5344CB8AC3E}">
+        <p14:creationId xmlns:p14="http://schemas.microsoft.com/office/powerpoint/2010/main" val="1514601049"/>
+      </p:ext>
+    </p:extLst>
+  </p:cSld>
+  <p:clrMapOvr>
+    <a:masterClrMapping/>
+  </p:clrMapOvr>
+</p:notes>
+</file>
+
+<file path=ppt/notesSlides/notesSlide7.xml><?xml version="1.0" encoding="utf-8"?>
+<p:notes xmlns:a="http://schemas.openxmlformats.org/drawingml/2006/main" xmlns:r="http://schemas.openxmlformats.org/officeDocument/2006/relationships" xmlns:p="http://schemas.openxmlformats.org/presentationml/2006/main">
+  <p:cSld>
+    <p:spTree>
+      <p:nvGrpSpPr>
+        <p:cNvPr id="1" name=""/>
+        <p:cNvGrpSpPr/>
+        <p:nvPr/>
+      </p:nvGrpSpPr>
+      <p:grpSpPr>
+        <a:xfrm>
+          <a:off x="0" y="0"/>
+          <a:ext cx="0" cy="0"/>
+          <a:chOff x="0" y="0"/>
+          <a:chExt cx="0" cy="0"/>
+        </a:xfrm>
+      </p:grpSpPr>
+      <p:sp>
+        <p:nvSpPr>
+          <p:cNvPr id="2" name="Slide Image Placeholder 1"/>
+          <p:cNvSpPr>
+            <a:spLocks noGrp="1" noRot="1" noChangeAspect="1"/>
+          </p:cNvSpPr>
+          <p:nvPr>
+            <p:ph type="sldImg"/>
+          </p:nvPr>
+        </p:nvSpPr>
+        <p:spPr/>
+      </p:sp>
+      <p:sp>
+        <p:nvSpPr>
+          <p:cNvPr id="3" name="Notes Placeholder 2"/>
+          <p:cNvSpPr>
+            <a:spLocks noGrp="1"/>
+          </p:cNvSpPr>
+          <p:nvPr>
+            <p:ph type="body" idx="1"/>
+          </p:nvPr>
+        </p:nvSpPr>
+        <p:spPr/>
+        <p:txBody>
+          <a:bodyPr/>
+          <a:lstStyle/>
+          <a:p>
+            <a:r>
+              <a:rPr lang="ro-RO" dirty="0" smtClean="0"/>
+              <a:t>RetentionPolicy – determina pana</a:t>
+            </a:r>
+            <a:r>
+              <a:rPr lang="ro-RO" baseline="0" dirty="0" smtClean="0"/>
+              <a:t> in ce punct este adnotarea vizbila</a:t>
+            </a:r>
+            <a:endParaRPr lang="en-US" dirty="0"/>
+          </a:p>
+        </p:txBody>
+      </p:sp>
+      <p:sp>
+        <p:nvSpPr>
+          <p:cNvPr id="4" name="Slide Number Placeholder 3"/>
+          <p:cNvSpPr>
+            <a:spLocks noGrp="1"/>
+          </p:cNvSpPr>
+          <p:nvPr>
+            <p:ph type="sldNum" sz="quarter" idx="10"/>
+          </p:nvPr>
+        </p:nvSpPr>
+        <p:spPr/>
+        <p:txBody>
+          <a:bodyPr/>
+          <a:lstStyle/>
+          <a:p>
+            <a:fld id="{84377D70-F193-4353-836F-31B604DF4B77}" type="slidenum">
+              <a:rPr lang="en-US" smtClean="0"/>
+              <a:pPr/>
+              <a:t>15</a:t>
+            </a:fld>
+            <a:endParaRPr lang="en-US"/>
+          </a:p>
+        </p:txBody>
+      </p:sp>
+    </p:spTree>
+    <p:extLst>
+      <p:ext uri="{BB962C8B-B14F-4D97-AF65-F5344CB8AC3E}">
+        <p14:creationId xmlns:p14="http://schemas.microsoft.com/office/powerpoint/2010/main" val="3114016638"/>
+      </p:ext>
+    </p:extLst>
+  </p:cSld>
+  <p:clrMapOvr>
+    <a:masterClrMapping/>
+  </p:clrMapOvr>
+</p:notes>
+</file>
+
+<file path=ppt/notesSlides/notesSlide8.xml><?xml version="1.0" encoding="utf-8"?>
+<p:notes xmlns:a="http://schemas.openxmlformats.org/drawingml/2006/main" xmlns:r="http://schemas.openxmlformats.org/officeDocument/2006/relationships" xmlns:p="http://schemas.openxmlformats.org/presentationml/2006/main">
+  <p:cSld>
+    <p:spTree>
+      <p:nvGrpSpPr>
+        <p:cNvPr id="1" name=""/>
+        <p:cNvGrpSpPr/>
+        <p:nvPr/>
+      </p:nvGrpSpPr>
+      <p:grpSpPr>
+        <a:xfrm>
+          <a:off x="0" y="0"/>
+          <a:ext cx="0" cy="0"/>
+          <a:chOff x="0" y="0"/>
+          <a:chExt cx="0" cy="0"/>
+        </a:xfrm>
+      </p:grpSpPr>
+      <p:sp>
+        <p:nvSpPr>
+          <p:cNvPr id="2" name="Slide Image Placeholder 1"/>
+          <p:cNvSpPr>
+            <a:spLocks noGrp="1" noRot="1" noChangeAspect="1"/>
+          </p:cNvSpPr>
+          <p:nvPr>
+            <p:ph type="sldImg"/>
+          </p:nvPr>
+        </p:nvSpPr>
+        <p:spPr/>
+      </p:sp>
+      <p:sp>
+        <p:nvSpPr>
+          <p:cNvPr id="3" name="Notes Placeholder 2"/>
+          <p:cNvSpPr>
+            <a:spLocks noGrp="1"/>
+          </p:cNvSpPr>
+          <p:nvPr>
+            <p:ph type="body" idx="1"/>
+          </p:nvPr>
+        </p:nvSpPr>
+        <p:spPr/>
+        <p:txBody>
+          <a:bodyPr/>
+          <a:lstStyle/>
+          <a:p>
+            <a:r>
+              <a:rPr lang="en-US" sz="1200" dirty="0" err="1" smtClean="0"/>
+              <a:t>RetentionPolicy</a:t>
+            </a:r>
+            <a:r>
+              <a:rPr lang="en-US" sz="1200" dirty="0" smtClean="0"/>
+              <a:t>.</a:t>
+            </a:r>
+            <a:r>
+              <a:rPr lang="ro-RO" sz="1200" dirty="0" smtClean="0"/>
+              <a:t>SOURCE</a:t>
+            </a:r>
+            <a:r>
+              <a:rPr lang="ro-RO" sz="1200" baseline="0" dirty="0" smtClean="0"/>
+              <a:t> – adnotarea nu se mai ia in considerare la compile time</a:t>
+            </a:r>
+          </a:p>
+          <a:p>
+            <a:r>
+              <a:rPr lang="ro-RO" sz="1200" baseline="0" dirty="0" smtClean="0"/>
+              <a:t>RetentionPolicy.CLASS - adnotarea nu se mai ia in considerare la runtime</a:t>
+            </a:r>
+          </a:p>
+          <a:p>
+            <a:pPr marL="0" marR="0" indent="0" algn="l" defTabSz="914400" rtl="0" eaLnBrk="1" fontAlgn="auto" latinLnBrk="0" hangingPunct="1">
+              <a:lnSpc>
+                <a:spcPct val="100000"/>
+              </a:lnSpc>
+              <a:spcBef>
+                <a:spcPts val="0"/>
+              </a:spcBef>
+              <a:spcAft>
+                <a:spcPts val="0"/>
+              </a:spcAft>
+              <a:buClrTx/>
+              <a:buSzTx/>
+              <a:buFontTx/>
+              <a:buNone/>
+              <a:tabLst/>
+              <a:defRPr/>
+            </a:pPr>
+            <a:r>
+              <a:rPr lang="ro-RO" sz="1200" baseline="0" dirty="0" smtClean="0"/>
+              <a:t>RetentionPolicy.CLASS - adnotarea va fi vizibila pe tot parcusul rularii JVM</a:t>
+            </a:r>
+          </a:p>
+          <a:p>
+            <a:endParaRPr lang="en-US" dirty="0"/>
+          </a:p>
+        </p:txBody>
+      </p:sp>
+      <p:sp>
+        <p:nvSpPr>
+          <p:cNvPr id="4" name="Slide Number Placeholder 3"/>
+          <p:cNvSpPr>
+            <a:spLocks noGrp="1"/>
+          </p:cNvSpPr>
+          <p:nvPr>
+            <p:ph type="sldNum" sz="quarter" idx="10"/>
+          </p:nvPr>
+        </p:nvSpPr>
+        <p:spPr/>
+        <p:txBody>
+          <a:bodyPr/>
+          <a:lstStyle/>
+          <a:p>
+            <a:fld id="{84377D70-F193-4353-836F-31B604DF4B77}" type="slidenum">
+              <a:rPr lang="en-US" smtClean="0"/>
+              <a:pPr/>
+              <a:t>17</a:t>
+            </a:fld>
+            <a:endParaRPr lang="en-US"/>
+          </a:p>
+        </p:txBody>
+      </p:sp>
+    </p:spTree>
+    <p:extLst>
+      <p:ext uri="{BB962C8B-B14F-4D97-AF65-F5344CB8AC3E}">
+        <p14:creationId xmlns:p14="http://schemas.microsoft.com/office/powerpoint/2010/main" val="2344249688"/>
+      </p:ext>
+    </p:extLst>
+  </p:cSld>
+  <p:clrMapOvr>
+    <a:masterClrMapping/>
+  </p:clrMapOvr>
+</p:notes>
+</file>
+
+<file path=ppt/notesSlides/notesSlide9.xml><?xml version="1.0" encoding="utf-8"?>
+<p:notes xmlns:a="http://schemas.openxmlformats.org/drawingml/2006/main" xmlns:r="http://schemas.openxmlformats.org/officeDocument/2006/relationships" xmlns:p="http://schemas.openxmlformats.org/presentationml/2006/main">
+  <p:cSld>
+    <p:spTree>
+      <p:nvGrpSpPr>
+        <p:cNvPr id="1" name=""/>
+        <p:cNvGrpSpPr/>
+        <p:nvPr/>
+      </p:nvGrpSpPr>
+      <p:grpSpPr>
+        <a:xfrm>
+          <a:off x="0" y="0"/>
+          <a:ext cx="0" cy="0"/>
+          <a:chOff x="0" y="0"/>
+          <a:chExt cx="0" cy="0"/>
+        </a:xfrm>
+      </p:grpSpPr>
+      <p:sp>
+        <p:nvSpPr>
+          <p:cNvPr id="2" name="Slide Image Placeholder 1"/>
+          <p:cNvSpPr>
+            <a:spLocks noGrp="1" noRot="1" noChangeAspect="1"/>
+          </p:cNvSpPr>
+          <p:nvPr>
+            <p:ph type="sldImg"/>
+          </p:nvPr>
+        </p:nvSpPr>
+        <p:spPr/>
+      </p:sp>
+      <p:sp>
+        <p:nvSpPr>
+          <p:cNvPr id="3" name="Notes Placeholder 2"/>
+          <p:cNvSpPr>
+            <a:spLocks noGrp="1"/>
+          </p:cNvSpPr>
+          <p:nvPr>
+            <p:ph type="body" idx="1"/>
+          </p:nvPr>
+        </p:nvSpPr>
+        <p:spPr/>
+        <p:txBody>
+          <a:bodyPr/>
+          <a:lstStyle/>
+          <a:p>
+            <a:r>
+              <a:rPr lang="ro-RO" sz="1200" dirty="0" smtClean="0"/>
+              <a:t>getDeclaredAnnotations()</a:t>
+            </a:r>
+            <a:r>
+              <a:rPr lang="ro-RO" sz="1200" baseline="0" dirty="0" smtClean="0"/>
+              <a:t> – returneaza toate adnotarile din clasa curenta/field/metoda</a:t>
+            </a:r>
+          </a:p>
+          <a:p>
+            <a:r>
+              <a:rPr lang="en-US" sz="1200" dirty="0" err="1" smtClean="0"/>
+              <a:t>getAnnotations</a:t>
+            </a:r>
+            <a:r>
+              <a:rPr lang="en-US" sz="1200" dirty="0" smtClean="0"/>
+              <a:t>()</a:t>
+            </a:r>
+            <a:r>
+              <a:rPr lang="ro-RO" sz="1200" baseline="0" dirty="0" smtClean="0"/>
+              <a:t> </a:t>
+            </a:r>
+            <a:r>
+              <a:rPr lang="ro-RO" sz="1200" baseline="0" smtClean="0"/>
+              <a:t>– </a:t>
+            </a:r>
+            <a:r>
+              <a:rPr lang="ro-RO" sz="1200" baseline="0" smtClean="0"/>
+              <a:t>returneaza </a:t>
+            </a:r>
+            <a:r>
+              <a:rPr lang="ro-RO" sz="1200" baseline="0" dirty="0" smtClean="0"/>
+              <a:t>adnotarile </a:t>
+            </a:r>
+            <a:r>
+              <a:rPr lang="ro-RO" sz="1200" baseline="0" smtClean="0"/>
+              <a:t>din </a:t>
+            </a:r>
+            <a:r>
+              <a:rPr lang="ro-RO" sz="1200" baseline="0" smtClean="0"/>
+              <a:t>clasa curenta si clasa pe care o mosteneste</a:t>
+            </a:r>
+            <a:endParaRPr lang="en-US" dirty="0"/>
+          </a:p>
+        </p:txBody>
+      </p:sp>
+      <p:sp>
+        <p:nvSpPr>
+          <p:cNvPr id="4" name="Slide Number Placeholder 3"/>
+          <p:cNvSpPr>
+            <a:spLocks noGrp="1"/>
+          </p:cNvSpPr>
+          <p:nvPr>
+            <p:ph type="sldNum" sz="quarter" idx="10"/>
+          </p:nvPr>
+        </p:nvSpPr>
+        <p:spPr/>
+        <p:txBody>
+          <a:bodyPr/>
+          <a:lstStyle/>
+          <a:p>
+            <a:fld id="{84377D70-F193-4353-836F-31B604DF4B77}" type="slidenum">
+              <a:rPr lang="en-US" smtClean="0"/>
+              <a:pPr/>
+              <a:t>18</a:t>
+            </a:fld>
+            <a:endParaRPr lang="en-US"/>
+          </a:p>
+        </p:txBody>
+      </p:sp>
+    </p:spTree>
+    <p:extLst>
+      <p:ext uri="{BB962C8B-B14F-4D97-AF65-F5344CB8AC3E}">
+        <p14:creationId xmlns:p14="http://schemas.microsoft.com/office/powerpoint/2010/main" val="3236592804"/>
       </p:ext>
     </p:extLst>
   </p:cSld>
@@ -2736,7 +3371,7 @@
             <a:fld id="{0DDD1723-F08C-BC4A-A158-087EDAF93B47}" type="datetimeFigureOut">
               <a:rPr lang="en-US"/>
               <a:pPr/>
-              <a:t>6/28/2016</a:t>
+              <a:t>7/6/2016</a:t>
             </a:fld>
             <a:endParaRPr lang="en-US"/>
           </a:p>
@@ -3139,14 +3774,14 @@
       </p:sp>
       <p:sp>
         <p:nvSpPr>
-          <p:cNvPr id="7" name="TextBox 6"/>
+          <p:cNvPr id="3" name="TextBox 2"/>
           <p:cNvSpPr txBox="1"/>
           <p:nvPr/>
         </p:nvSpPr>
         <p:spPr>
           <a:xfrm>
-            <a:off x="720725" y="6218595"/>
-            <a:ext cx="7704138" cy="246221"/>
+            <a:off x="1043189" y="6001555"/>
+            <a:ext cx="7381674" cy="523220"/>
           </a:xfrm>
           <a:prstGeom prst="rect">
             <a:avLst/>
@@ -3154,26 +3789,41 @@
           <a:noFill/>
         </p:spPr>
         <p:txBody>
-          <a:bodyPr wrap="square" lIns="0" tIns="0" rIns="0" bIns="0" rtlCol="0" anchor="ctr" anchorCtr="0">
+          <a:bodyPr wrap="square" rtlCol="0">
             <a:spAutoFit/>
           </a:bodyPr>
           <a:lstStyle/>
           <a:p>
             <a:r>
-              <a:rPr lang="en-US" sz="1600" dirty="0" smtClean="0">
+              <a:rPr lang="ro-RO" sz="1400" b="1" dirty="0">
                 <a:solidFill>
-                  <a:srgbClr val="FFFFFF"/>
+                  <a:schemeClr val="bg1"/>
                 </a:solidFill>
                 <a:latin typeface="Arial"/>
+                <a:ea typeface="+mj-ea"/>
                 <a:cs typeface="Arial"/>
               </a:rPr>
-              <a:t>Mihai TUDORACHE	  								     Diana DIACONU</a:t>
-            </a:r>
-            <a:endParaRPr lang="en-US" sz="1600" dirty="0">
+              <a:t>Diana Diaconu							Raluca Turcu</a:t>
+            </a:r>
+          </a:p>
+          <a:p>
+            <a:r>
+              <a:rPr lang="ro-RO" sz="1400" b="1" dirty="0">
+                <a:solidFill>
+                  <a:schemeClr val="bg1"/>
+                </a:solidFill>
+                <a:latin typeface="Arial"/>
+                <a:ea typeface="+mj-ea"/>
+                <a:cs typeface="Arial"/>
+              </a:rPr>
+              <a:t>Mihaela Scripcaru						Raluca Russindilar</a:t>
+            </a:r>
+            <a:endParaRPr lang="en-US" sz="1400" b="1" dirty="0">
               <a:solidFill>
-                <a:srgbClr val="FFFFFF"/>
+                <a:schemeClr val="bg1"/>
               </a:solidFill>
               <a:latin typeface="Arial"/>
+              <a:ea typeface="+mj-ea"/>
               <a:cs typeface="Arial"/>
             </a:endParaRPr>
           </a:p>
@@ -3292,7 +3942,7 @@
                           <a:latin typeface="+mn-lt"/>
                           <a:ea typeface="+mn-ea"/>
                           <a:cs typeface="+mn-cs"/>
-                          <a:hlinkClick r:id="rId2"/>
+                          <a:hlinkClick r:id="rId3"/>
                         </a:rPr>
                         <a:t>Class</a:t>
                       </a:r>
@@ -3352,7 +4002,7 @@
                     <a:p>
                       <a:r>
                         <a:rPr lang="ro-RO" sz="2000" dirty="0">
-                          <a:hlinkClick r:id="rId2"/>
+                          <a:hlinkClick r:id="rId3"/>
                         </a:rPr>
                         <a:t>getDeclaredField()</a:t>
                       </a:r>
@@ -3412,7 +4062,7 @@
                     <a:p>
                       <a:r>
                         <a:rPr lang="ro-RO" sz="2000" dirty="0">
-                          <a:hlinkClick r:id="rId2"/>
+                          <a:hlinkClick r:id="rId3"/>
                         </a:rPr>
                         <a:t>getField()</a:t>
                       </a:r>
@@ -3472,7 +4122,7 @@
                     <a:p>
                       <a:r>
                         <a:rPr lang="ro-RO" sz="2000">
-                          <a:hlinkClick r:id="rId2"/>
+                          <a:hlinkClick r:id="rId3"/>
                         </a:rPr>
                         <a:t>getDeclaredFields()</a:t>
                       </a:r>
@@ -3533,7 +4183,7 @@
                     <a:p>
                       <a:r>
                         <a:rPr lang="ro-RO" sz="2000" dirty="0">
-                          <a:hlinkClick r:id="rId2"/>
+                          <a:hlinkClick r:id="rId3"/>
                         </a:rPr>
                         <a:t>getFields()</a:t>
                       </a:r>
@@ -4083,7 +4733,7 @@
                     <a:p>
                       <a:r>
                         <a:rPr lang="ro-RO" sz="2000" dirty="0">
-                          <a:hlinkClick r:id="rId2"/>
+                          <a:hlinkClick r:id="rId3"/>
                         </a:rPr>
                         <a:t>Class</a:t>
                       </a:r>
@@ -4142,12 +4792,12 @@
                     <a:lstStyle/>
                     <a:p>
                       <a:r>
-                        <a:rPr lang="ro-RO" smtClean="0">
-                          <a:hlinkClick r:id="rId2"/>
+                        <a:rPr lang="ro-RO" dirty="0" smtClean="0">
+                          <a:hlinkClick r:id="rId3"/>
                         </a:rPr>
                         <a:t>getDeclaredConstructor()</a:t>
                       </a:r>
-                      <a:endParaRPr lang="ro-RO"/>
+                      <a:endParaRPr lang="ro-RO" dirty="0"/>
                     </a:p>
                   </a:txBody>
                   <a:tcPr anchor="ctr"/>
@@ -4206,7 +4856,7 @@
                     <a:p>
                       <a:r>
                         <a:rPr lang="ro-RO" smtClean="0">
-                          <a:hlinkClick r:id="rId2"/>
+                          <a:hlinkClick r:id="rId3"/>
                         </a:rPr>
                         <a:t>getConstructor()</a:t>
                       </a:r>
@@ -4269,7 +4919,7 @@
                     <a:p>
                       <a:r>
                         <a:rPr lang="ro-RO" smtClean="0">
-                          <a:hlinkClick r:id="rId2"/>
+                          <a:hlinkClick r:id="rId3"/>
                         </a:rPr>
                         <a:t>getDeclaredConstructors()</a:t>
                       </a:r>
@@ -4332,7 +4982,7 @@
                     <a:p>
                       <a:r>
                         <a:rPr lang="ro-RO" smtClean="0">
-                          <a:hlinkClick r:id="rId2"/>
+                          <a:hlinkClick r:id="rId3"/>
                         </a:rPr>
                         <a:t>getConstructors()</a:t>
                       </a:r>
@@ -5282,7 +5932,11 @@
           <a:p>
             <a:r>
               <a:rPr lang="ro-RO" sz="4400" dirty="0" smtClean="0"/>
-              <a:t>Class Object</a:t>
+              <a:t>Class </a:t>
+            </a:r>
+            <a:r>
+              <a:rPr lang="ro-RO" sz="4400" dirty="0" smtClean="0"/>
+              <a:t>Object</a:t>
             </a:r>
             <a:endParaRPr lang="en-US" sz="4400" dirty="0" smtClean="0"/>
           </a:p>
@@ -6578,12 +7232,12 @@
 </file>
 
 <file path=customXml/item1.xml><?xml version="1.0" encoding="utf-8"?>
-<p:properties xmlns:p="http://schemas.microsoft.com/office/2006/metadata/properties" xmlns:xsi="http://www.w3.org/2001/XMLSchema-instance" xmlns:pc="http://schemas.microsoft.com/office/infopath/2007/PartnerControls">
-  <documentManagement>
-    <PublishingExpirationDate xmlns="http://schemas.microsoft.com/sharepoint/v3" xsi:nil="true"/>
-    <PublishingStartDate xmlns="http://schemas.microsoft.com/sharepoint/v3" xsi:nil="true"/>
-  </documentManagement>
-</p:properties>
+<?mso-contentType ?>
+<FormTemplates xmlns="http://schemas.microsoft.com/sharepoint/v3/contenttype/forms">
+  <Display>DocumentLibraryForm</Display>
+  <Edit>DocumentLibraryForm</Edit>
+  <New>DocumentLibraryForm</New>
+</FormTemplates>
 </file>
 
 <file path=customXml/item2.xml><?xml version="1.0" encoding="utf-8"?>
@@ -6719,20 +7373,18 @@
 </file>
 
 <file path=customXml/item3.xml><?xml version="1.0" encoding="utf-8"?>
-<?mso-contentType ?>
-<FormTemplates xmlns="http://schemas.microsoft.com/sharepoint/v3/contenttype/forms">
-  <Display>DocumentLibraryForm</Display>
-  <Edit>DocumentLibraryForm</Edit>
-  <New>DocumentLibraryForm</New>
-</FormTemplates>
+<p:properties xmlns:p="http://schemas.microsoft.com/office/2006/metadata/properties" xmlns:xsi="http://www.w3.org/2001/XMLSchema-instance" xmlns:pc="http://schemas.microsoft.com/office/infopath/2007/PartnerControls">
+  <documentManagement>
+    <PublishingExpirationDate xmlns="http://schemas.microsoft.com/sharepoint/v3" xsi:nil="true"/>
+    <PublishingStartDate xmlns="http://schemas.microsoft.com/sharepoint/v3" xsi:nil="true"/>
+  </documentManagement>
+</p:properties>
 </file>
 
 <file path=customXml/itemProps1.xml><?xml version="1.0" encoding="utf-8"?>
-<ds:datastoreItem xmlns:ds="http://schemas.openxmlformats.org/officeDocument/2006/customXml" ds:itemID="{C1424CC9-255C-4972-B5F2-6F19B32F3DEA}">
+<ds:datastoreItem xmlns:ds="http://schemas.openxmlformats.org/officeDocument/2006/customXml" ds:itemID="{B3E8851E-A513-4DE1-BFEA-60B7444A3522}">
   <ds:schemaRefs>
-    <ds:schemaRef ds:uri="http://schemas.microsoft.com/office/2006/metadata/properties"/>
-    <ds:schemaRef ds:uri="http://schemas.microsoft.com/office/infopath/2007/PartnerControls"/>
-    <ds:schemaRef ds:uri="http://schemas.microsoft.com/sharepoint/v3"/>
+    <ds:schemaRef ds:uri="http://schemas.microsoft.com/sharepoint/v3/contenttype/forms"/>
   </ds:schemaRefs>
 </ds:datastoreItem>
 </file>
@@ -6756,9 +7408,11 @@
 </file>
 
 <file path=customXml/itemProps3.xml><?xml version="1.0" encoding="utf-8"?>
-<ds:datastoreItem xmlns:ds="http://schemas.openxmlformats.org/officeDocument/2006/customXml" ds:itemID="{B3E8851E-A513-4DE1-BFEA-60B7444A3522}">
+<ds:datastoreItem xmlns:ds="http://schemas.openxmlformats.org/officeDocument/2006/customXml" ds:itemID="{C1424CC9-255C-4972-B5F2-6F19B32F3DEA}">
   <ds:schemaRefs>
-    <ds:schemaRef ds:uri="http://schemas.microsoft.com/sharepoint/v3/contenttype/forms"/>
+    <ds:schemaRef ds:uri="http://schemas.microsoft.com/office/2006/metadata/properties"/>
+    <ds:schemaRef ds:uri="http://schemas.microsoft.com/office/infopath/2007/PartnerControls"/>
+    <ds:schemaRef ds:uri="http://schemas.microsoft.com/sharepoint/v3"/>
   </ds:schemaRefs>
 </ds:datastoreItem>
 </file>
</xml_diff>